<commit_message>
prep for assign 2
</commit_message>
<xml_diff>
--- a/assignments/research&literature/assign_1/Personal Presentation Notes - C15311966 Scientific Research & Literature.pptx
+++ b/assignments/research&literature/assign_1/Personal Presentation Notes - C15311966 Scientific Research & Literature.pptx
@@ -6,11 +6,12 @@
   </p:sldMasterIdLst>
   <p:sldIdLst>
     <p:sldId id="257" r:id="rId2"/>
-    <p:sldId id="258" r:id="rId3"/>
-    <p:sldId id="261" r:id="rId4"/>
-    <p:sldId id="262" r:id="rId5"/>
-    <p:sldId id="259" r:id="rId6"/>
-    <p:sldId id="260" r:id="rId7"/>
+    <p:sldId id="263" r:id="rId3"/>
+    <p:sldId id="258" r:id="rId4"/>
+    <p:sldId id="261" r:id="rId5"/>
+    <p:sldId id="262" r:id="rId6"/>
+    <p:sldId id="259" r:id="rId7"/>
+    <p:sldId id="260" r:id="rId8"/>
   </p:sldIdLst>
   <p:sldSz cx="12192000" cy="6858000"/>
   <p:notesSz cx="6858000" cy="9144000"/>
@@ -302,7 +303,7 @@
           <a:p>
             <a:fld id="{DECC975F-8D74-4BCA-AE32-B9B46E1704FF}" type="datetimeFigureOut">
               <a:rPr lang="en-GB" smtClean="0"/>
-              <a:t>14/02/2021</a:t>
+              <a:t>19/02/2021</a:t>
             </a:fld>
             <a:endParaRPr lang="en-GB"/>
           </a:p>
@@ -600,7 +601,7 @@
           <a:p>
             <a:fld id="{DECC975F-8D74-4BCA-AE32-B9B46E1704FF}" type="datetimeFigureOut">
               <a:rPr lang="en-GB" smtClean="0"/>
-              <a:t>14/02/2021</a:t>
+              <a:t>19/02/2021</a:t>
             </a:fld>
             <a:endParaRPr lang="en-GB"/>
           </a:p>
@@ -792,7 +793,7 @@
           <a:p>
             <a:fld id="{DECC975F-8D74-4BCA-AE32-B9B46E1704FF}" type="datetimeFigureOut">
               <a:rPr lang="en-GB" smtClean="0"/>
-              <a:t>14/02/2021</a:t>
+              <a:t>19/02/2021</a:t>
             </a:fld>
             <a:endParaRPr lang="en-GB"/>
           </a:p>
@@ -1053,7 +1054,7 @@
           <a:p>
             <a:fld id="{DECC975F-8D74-4BCA-AE32-B9B46E1704FF}" type="datetimeFigureOut">
               <a:rPr lang="en-GB" smtClean="0"/>
-              <a:t>14/02/2021</a:t>
+              <a:t>19/02/2021</a:t>
             </a:fld>
             <a:endParaRPr lang="en-GB"/>
           </a:p>
@@ -1477,7 +1478,7 @@
           <a:p>
             <a:fld id="{DECC975F-8D74-4BCA-AE32-B9B46E1704FF}" type="datetimeFigureOut">
               <a:rPr lang="en-GB" smtClean="0"/>
-              <a:t>14/02/2021</a:t>
+              <a:t>19/02/2021</a:t>
             </a:fld>
             <a:endParaRPr lang="en-GB"/>
           </a:p>
@@ -2014,7 +2015,7 @@
           <a:p>
             <a:fld id="{DECC975F-8D74-4BCA-AE32-B9B46E1704FF}" type="datetimeFigureOut">
               <a:rPr lang="en-GB" smtClean="0"/>
-              <a:t>14/02/2021</a:t>
+              <a:t>19/02/2021</a:t>
             </a:fld>
             <a:endParaRPr lang="en-GB"/>
           </a:p>
@@ -2878,7 +2879,7 @@
           <a:p>
             <a:fld id="{DECC975F-8D74-4BCA-AE32-B9B46E1704FF}" type="datetimeFigureOut">
               <a:rPr lang="en-GB" smtClean="0"/>
-              <a:t>14/02/2021</a:t>
+              <a:t>19/02/2021</a:t>
             </a:fld>
             <a:endParaRPr lang="en-GB"/>
           </a:p>
@@ -3048,7 +3049,7 @@
           <a:p>
             <a:fld id="{DECC975F-8D74-4BCA-AE32-B9B46E1704FF}" type="datetimeFigureOut">
               <a:rPr lang="en-GB" smtClean="0"/>
-              <a:t>14/02/2021</a:t>
+              <a:t>19/02/2021</a:t>
             </a:fld>
             <a:endParaRPr lang="en-GB"/>
           </a:p>
@@ -3232,7 +3233,7 @@
           <a:p>
             <a:fld id="{DECC975F-8D74-4BCA-AE32-B9B46E1704FF}" type="datetimeFigureOut">
               <a:rPr lang="en-GB" smtClean="0"/>
-              <a:t>14/02/2021</a:t>
+              <a:t>19/02/2021</a:t>
             </a:fld>
             <a:endParaRPr lang="en-GB"/>
           </a:p>
@@ -3402,7 +3403,7 @@
           <a:p>
             <a:fld id="{DECC975F-8D74-4BCA-AE32-B9B46E1704FF}" type="datetimeFigureOut">
               <a:rPr lang="en-GB" smtClean="0"/>
-              <a:t>14/02/2021</a:t>
+              <a:t>19/02/2021</a:t>
             </a:fld>
             <a:endParaRPr lang="en-GB"/>
           </a:p>
@@ -3646,7 +3647,7 @@
           <a:p>
             <a:fld id="{DECC975F-8D74-4BCA-AE32-B9B46E1704FF}" type="datetimeFigureOut">
               <a:rPr lang="en-GB" smtClean="0"/>
-              <a:t>14/02/2021</a:t>
+              <a:t>19/02/2021</a:t>
             </a:fld>
             <a:endParaRPr lang="en-GB"/>
           </a:p>
@@ -3882,7 +3883,7 @@
           <a:p>
             <a:fld id="{DECC975F-8D74-4BCA-AE32-B9B46E1704FF}" type="datetimeFigureOut">
               <a:rPr lang="en-GB" smtClean="0"/>
-              <a:t>14/02/2021</a:t>
+              <a:t>19/02/2021</a:t>
             </a:fld>
             <a:endParaRPr lang="en-GB"/>
           </a:p>
@@ -4348,7 +4349,7 @@
           <a:p>
             <a:fld id="{DECC975F-8D74-4BCA-AE32-B9B46E1704FF}" type="datetimeFigureOut">
               <a:rPr lang="en-GB" smtClean="0"/>
-              <a:t>14/02/2021</a:t>
+              <a:t>19/02/2021</a:t>
             </a:fld>
             <a:endParaRPr lang="en-GB"/>
           </a:p>
@@ -4466,7 +4467,7 @@
           <a:p>
             <a:fld id="{DECC975F-8D74-4BCA-AE32-B9B46E1704FF}" type="datetimeFigureOut">
               <a:rPr lang="en-GB" smtClean="0"/>
-              <a:t>14/02/2021</a:t>
+              <a:t>19/02/2021</a:t>
             </a:fld>
             <a:endParaRPr lang="en-GB"/>
           </a:p>
@@ -4561,7 +4562,7 @@
           <a:p>
             <a:fld id="{DECC975F-8D74-4BCA-AE32-B9B46E1704FF}" type="datetimeFigureOut">
               <a:rPr lang="en-GB" smtClean="0"/>
-              <a:t>14/02/2021</a:t>
+              <a:t>19/02/2021</a:t>
             </a:fld>
             <a:endParaRPr lang="en-GB"/>
           </a:p>
@@ -4816,7 +4817,7 @@
           <a:p>
             <a:fld id="{DECC975F-8D74-4BCA-AE32-B9B46E1704FF}" type="datetimeFigureOut">
               <a:rPr lang="en-GB" smtClean="0"/>
-              <a:t>14/02/2021</a:t>
+              <a:t>19/02/2021</a:t>
             </a:fld>
             <a:endParaRPr lang="en-GB"/>
           </a:p>
@@ -5116,7 +5117,7 @@
           <a:p>
             <a:fld id="{DECC975F-8D74-4BCA-AE32-B9B46E1704FF}" type="datetimeFigureOut">
               <a:rPr lang="en-GB" smtClean="0"/>
-              <a:t>14/02/2021</a:t>
+              <a:t>19/02/2021</a:t>
             </a:fld>
             <a:endParaRPr lang="en-GB"/>
           </a:p>
@@ -5350,7 +5351,7 @@
           <a:p>
             <a:fld id="{DECC975F-8D74-4BCA-AE32-B9B46E1704FF}" type="datetimeFigureOut">
               <a:rPr lang="en-GB" smtClean="0"/>
-              <a:t>14/02/2021</a:t>
+              <a:t>19/02/2021</a:t>
             </a:fld>
             <a:endParaRPr lang="en-GB"/>
           </a:p>
@@ -6313,7 +6314,7 @@
           <p:cNvPr id="2" name="Title 1">
             <a:extLst>
               <a:ext uri="{FF2B5EF4-FFF2-40B4-BE49-F238E27FC236}">
-                <a16:creationId xmlns:a16="http://schemas.microsoft.com/office/drawing/2014/main" id="{A2A0A215-D82E-4A78-AA0D-8E00F67B8601}"/>
+                <a16:creationId xmlns:a16="http://schemas.microsoft.com/office/drawing/2014/main" id="{D98030CE-854D-47A2-BEEC-B5B37BE3671B}"/>
               </a:ext>
             </a:extLst>
           </p:cNvPr>
@@ -6331,7 +6332,7 @@
           <a:p>
             <a:r>
               <a:rPr lang="en-US" dirty="0"/>
-              <a:t>What is Meta Analysis?</a:t>
+              <a:t>Intro</a:t>
             </a:r>
             <a:endParaRPr lang="en-GB" dirty="0"/>
           </a:p>
@@ -6342,7 +6343,7 @@
           <p:cNvPr id="3" name="Content Placeholder 2">
             <a:extLst>
               <a:ext uri="{FF2B5EF4-FFF2-40B4-BE49-F238E27FC236}">
-                <a16:creationId xmlns:a16="http://schemas.microsoft.com/office/drawing/2014/main" id="{565D08C2-3249-4EE3-A4EC-A34B5054B64F}"/>
+                <a16:creationId xmlns:a16="http://schemas.microsoft.com/office/drawing/2014/main" id="{75630C7D-6528-4E2A-958A-94D4C4ACA55B}"/>
               </a:ext>
             </a:extLst>
           </p:cNvPr>
@@ -6360,28 +6361,53 @@
           <a:p>
             <a:r>
               <a:rPr lang="en-US" dirty="0"/>
-              <a:t>It’s a research method that collects smaller studies in order to calculate an final result</a:t>
+              <a:t>Some common research methods in DS are survey, experiments, interview, case study</a:t>
             </a:r>
           </a:p>
           <a:p>
             <a:r>
               <a:rPr lang="en-US" dirty="0"/>
-              <a:t>This is a complicated process as different studies will require different levels of normalization</a:t>
-            </a:r>
-          </a:p>
-          <a:p>
+              <a:t>These I think can be encompassed into two groups, a data collection category and data </a:t>
+            </a:r>
+            <a:r>
+              <a:rPr lang="en-US" dirty="0" err="1"/>
+              <a:t>analsysis</a:t>
+            </a:r>
             <a:r>
               <a:rPr lang="en-US" dirty="0"/>
-              <a:t>Each study has its limitations whether on its data or results that need to somehow be compared with the latter </a:t>
-            </a:r>
-            <a:endParaRPr lang="en-GB" dirty="0"/>
+              <a:t> </a:t>
+            </a:r>
+          </a:p>
+          <a:p>
+            <a:endParaRPr lang="en-US" dirty="0"/>
+          </a:p>
+          <a:p>
+            <a:r>
+              <a:rPr lang="en-US" dirty="0"/>
+              <a:t>I wanted to focus on analytics, hence the array analysis methods</a:t>
+            </a:r>
+          </a:p>
+          <a:p>
+            <a:r>
+              <a:rPr lang="en-US" dirty="0"/>
+              <a:t>I’ll be focusing on the bottom 3</a:t>
+            </a:r>
+          </a:p>
+          <a:p>
+            <a:endParaRPr lang="en-US" dirty="0"/>
+          </a:p>
+          <a:p>
+            <a:r>
+              <a:rPr lang="en-US" dirty="0"/>
+              <a:t>The paper ill be covering is a reasonably short paper on the onset of Alzheimer's disease </a:t>
+            </a:r>
           </a:p>
         </p:txBody>
       </p:sp>
     </p:spTree>
     <p:extLst>
       <p:ext uri="{BB962C8B-B14F-4D97-AF65-F5344CB8AC3E}">
-        <p14:creationId xmlns:p14="http://schemas.microsoft.com/office/powerpoint/2010/main" val="525070894"/>
+        <p14:creationId xmlns:p14="http://schemas.microsoft.com/office/powerpoint/2010/main" val="348598779"/>
       </p:ext>
     </p:extLst>
   </p:cSld>
@@ -6413,7 +6439,7 @@
           <p:cNvPr id="2" name="Title 1">
             <a:extLst>
               <a:ext uri="{FF2B5EF4-FFF2-40B4-BE49-F238E27FC236}">
-                <a16:creationId xmlns:a16="http://schemas.microsoft.com/office/drawing/2014/main" id="{E28EA429-2758-492E-B709-2F01B3ECF232}"/>
+                <a16:creationId xmlns:a16="http://schemas.microsoft.com/office/drawing/2014/main" id="{A2A0A215-D82E-4A78-AA0D-8E00F67B8601}"/>
               </a:ext>
             </a:extLst>
           </p:cNvPr>
@@ -6431,7 +6457,7 @@
           <a:p>
             <a:r>
               <a:rPr lang="en-US" dirty="0"/>
-              <a:t>What is Thematic Analysis ?</a:t>
+              <a:t>What is Meta Analysis?</a:t>
             </a:r>
             <a:endParaRPr lang="en-GB" dirty="0"/>
           </a:p>
@@ -6442,7 +6468,7 @@
           <p:cNvPr id="3" name="Content Placeholder 2">
             <a:extLst>
               <a:ext uri="{FF2B5EF4-FFF2-40B4-BE49-F238E27FC236}">
-                <a16:creationId xmlns:a16="http://schemas.microsoft.com/office/drawing/2014/main" id="{5A62AEBC-7715-46EB-93E7-DF6BC01AA123}"/>
+                <a16:creationId xmlns:a16="http://schemas.microsoft.com/office/drawing/2014/main" id="{565D08C2-3249-4EE3-A4EC-A34B5054B64F}"/>
               </a:ext>
             </a:extLst>
           </p:cNvPr>
@@ -6460,39 +6486,28 @@
           <a:p>
             <a:r>
               <a:rPr lang="en-US" dirty="0"/>
-              <a:t>Used to find or identify themes in texts</a:t>
+              <a:t>It’s a research method that collects smaller studies in order to calculate a final result</a:t>
             </a:r>
           </a:p>
           <a:p>
             <a:r>
               <a:rPr lang="en-US" dirty="0"/>
-              <a:t>Its both Deductive because you can start with a research question or hypothesis </a:t>
+              <a:t>This is a complicated process as different studies will require different levels of normalization</a:t>
             </a:r>
           </a:p>
           <a:p>
             <a:r>
               <a:rPr lang="en-US" dirty="0"/>
-              <a:t>However patterns can arise that could generate a theory by the end</a:t>
-            </a:r>
-          </a:p>
-          <a:p>
-            <a:r>
-              <a:rPr lang="en-US" dirty="0"/>
-              <a:t>Since a theme is being identified a case study would be seem like a good approach</a:t>
-            </a:r>
-          </a:p>
-          <a:p>
-            <a:r>
-              <a:rPr lang="en-US" dirty="0"/>
-              <a:t>Grounded Theory for the same reason that the inductive approach can be taken </a:t>
-            </a:r>
+              <a:t>Each study has its limitations whether on its data or results that need to somehow be compared with the latter </a:t>
+            </a:r>
+            <a:endParaRPr lang="en-GB" dirty="0"/>
           </a:p>
         </p:txBody>
       </p:sp>
     </p:spTree>
     <p:extLst>
       <p:ext uri="{BB962C8B-B14F-4D97-AF65-F5344CB8AC3E}">
-        <p14:creationId xmlns:p14="http://schemas.microsoft.com/office/powerpoint/2010/main" val="561292200"/>
+        <p14:creationId xmlns:p14="http://schemas.microsoft.com/office/powerpoint/2010/main" val="525070894"/>
       </p:ext>
     </p:extLst>
   </p:cSld>
@@ -6524,7 +6539,7 @@
           <p:cNvPr id="2" name="Title 1">
             <a:extLst>
               <a:ext uri="{FF2B5EF4-FFF2-40B4-BE49-F238E27FC236}">
-                <a16:creationId xmlns:a16="http://schemas.microsoft.com/office/drawing/2014/main" id="{E7921D1E-C2E2-42DF-9B89-DB27F84A4122}"/>
+                <a16:creationId xmlns:a16="http://schemas.microsoft.com/office/drawing/2014/main" id="{E28EA429-2758-492E-B709-2F01B3ECF232}"/>
               </a:ext>
             </a:extLst>
           </p:cNvPr>
@@ -6542,7 +6557,7 @@
           <a:p>
             <a:r>
               <a:rPr lang="en-US" dirty="0"/>
-              <a:t> What is Content Analysis?</a:t>
+              <a:t>What is Thematic Analysis ?</a:t>
             </a:r>
             <a:endParaRPr lang="en-GB" dirty="0"/>
           </a:p>
@@ -6553,7 +6568,7 @@
           <p:cNvPr id="3" name="Content Placeholder 2">
             <a:extLst>
               <a:ext uri="{FF2B5EF4-FFF2-40B4-BE49-F238E27FC236}">
-                <a16:creationId xmlns:a16="http://schemas.microsoft.com/office/drawing/2014/main" id="{A6F1432A-EE39-487C-B38C-959C95BDD7C0}"/>
+                <a16:creationId xmlns:a16="http://schemas.microsoft.com/office/drawing/2014/main" id="{5A62AEBC-7715-46EB-93E7-DF6BC01AA123}"/>
               </a:ext>
             </a:extLst>
           </p:cNvPr>
@@ -6571,38 +6586,39 @@
           <a:p>
             <a:r>
               <a:rPr lang="en-US" dirty="0"/>
-              <a:t>Similar to Thematic analysis used to </a:t>
-            </a:r>
-            <a:r>
-              <a:rPr lang="en-US" dirty="0" err="1"/>
-              <a:t>analyse</a:t>
-            </a:r>
+              <a:t>Used to find or identify themes in texts</a:t>
+            </a:r>
+          </a:p>
+          <a:p>
             <a:r>
               <a:rPr lang="en-US" dirty="0"/>
-              <a:t> text, visual, audio or text a good example of  this is NLP or audio processing techniques </a:t>
+              <a:t>Its both Deductive because you can start with a research question or hypothesis </a:t>
             </a:r>
           </a:p>
           <a:p>
             <a:r>
               <a:rPr lang="en-US" dirty="0"/>
-              <a:t>However in this case its used to find presence of words or concepts</a:t>
+              <a:t>However patterns can arise that could generate a theory by the end</a:t>
             </a:r>
           </a:p>
           <a:p>
             <a:r>
               <a:rPr lang="en-US" dirty="0"/>
-              <a:t>Since words can be enumerated in some way, a Quantitative approach would also work in a way</a:t>
-            </a:r>
-          </a:p>
-          <a:p>
-            <a:endParaRPr lang="en-GB" dirty="0"/>
+              <a:t>Since a theme is being identified a case study would be seem like a good approach</a:t>
+            </a:r>
+          </a:p>
+          <a:p>
+            <a:r>
+              <a:rPr lang="en-US" dirty="0"/>
+              <a:t>Grounded Theory for the same reason that the inductive approach can be taken </a:t>
+            </a:r>
           </a:p>
         </p:txBody>
       </p:sp>
     </p:spTree>
     <p:extLst>
       <p:ext uri="{BB962C8B-B14F-4D97-AF65-F5344CB8AC3E}">
-        <p14:creationId xmlns:p14="http://schemas.microsoft.com/office/powerpoint/2010/main" val="4174411284"/>
+        <p14:creationId xmlns:p14="http://schemas.microsoft.com/office/powerpoint/2010/main" val="561292200"/>
       </p:ext>
     </p:extLst>
   </p:cSld>
@@ -6634,6 +6650,116 @@
           <p:cNvPr id="2" name="Title 1">
             <a:extLst>
               <a:ext uri="{FF2B5EF4-FFF2-40B4-BE49-F238E27FC236}">
+                <a16:creationId xmlns:a16="http://schemas.microsoft.com/office/drawing/2014/main" id="{E7921D1E-C2E2-42DF-9B89-DB27F84A4122}"/>
+              </a:ext>
+            </a:extLst>
+          </p:cNvPr>
+          <p:cNvSpPr>
+            <a:spLocks noGrp="1"/>
+          </p:cNvSpPr>
+          <p:nvPr>
+            <p:ph type="title"/>
+          </p:nvPr>
+        </p:nvSpPr>
+        <p:spPr/>
+        <p:txBody>
+          <a:bodyPr/>
+          <a:lstStyle/>
+          <a:p>
+            <a:r>
+              <a:rPr lang="en-US" dirty="0"/>
+              <a:t> What is Content Analysis?</a:t>
+            </a:r>
+            <a:endParaRPr lang="en-GB" dirty="0"/>
+          </a:p>
+        </p:txBody>
+      </p:sp>
+      <p:sp>
+        <p:nvSpPr>
+          <p:cNvPr id="3" name="Content Placeholder 2">
+            <a:extLst>
+              <a:ext uri="{FF2B5EF4-FFF2-40B4-BE49-F238E27FC236}">
+                <a16:creationId xmlns:a16="http://schemas.microsoft.com/office/drawing/2014/main" id="{A6F1432A-EE39-487C-B38C-959C95BDD7C0}"/>
+              </a:ext>
+            </a:extLst>
+          </p:cNvPr>
+          <p:cNvSpPr>
+            <a:spLocks noGrp="1"/>
+          </p:cNvSpPr>
+          <p:nvPr>
+            <p:ph idx="1"/>
+          </p:nvPr>
+        </p:nvSpPr>
+        <p:spPr/>
+        <p:txBody>
+          <a:bodyPr/>
+          <a:lstStyle/>
+          <a:p>
+            <a:r>
+              <a:rPr lang="en-US" dirty="0"/>
+              <a:t>Similar to Thematic analysis used to </a:t>
+            </a:r>
+            <a:r>
+              <a:rPr lang="en-US" dirty="0" err="1"/>
+              <a:t>analyse</a:t>
+            </a:r>
+            <a:r>
+              <a:rPr lang="en-US" dirty="0"/>
+              <a:t> text, visual, audio or text a good example of  this is NLP or audio processing techniques </a:t>
+            </a:r>
+          </a:p>
+          <a:p>
+            <a:r>
+              <a:rPr lang="en-US" dirty="0"/>
+              <a:t>However in this case its used to find presence of words or concepts</a:t>
+            </a:r>
+          </a:p>
+          <a:p>
+            <a:r>
+              <a:rPr lang="en-US" dirty="0"/>
+              <a:t>Since words can be enumerated in some way, a Quantitative approach would also work in a way</a:t>
+            </a:r>
+          </a:p>
+          <a:p>
+            <a:endParaRPr lang="en-GB" dirty="0"/>
+          </a:p>
+        </p:txBody>
+      </p:sp>
+    </p:spTree>
+    <p:extLst>
+      <p:ext uri="{BB962C8B-B14F-4D97-AF65-F5344CB8AC3E}">
+        <p14:creationId xmlns:p14="http://schemas.microsoft.com/office/powerpoint/2010/main" val="4174411284"/>
+      </p:ext>
+    </p:extLst>
+  </p:cSld>
+  <p:clrMapOvr>
+    <a:masterClrMapping/>
+  </p:clrMapOvr>
+</p:sld>
+</file>
+
+<file path=ppt/slides/slide6.xml><?xml version="1.0" encoding="utf-8"?>
+<p:sld xmlns:a="http://schemas.openxmlformats.org/drawingml/2006/main" xmlns:r="http://schemas.openxmlformats.org/officeDocument/2006/relationships" xmlns:p="http://schemas.openxmlformats.org/presentationml/2006/main">
+  <p:cSld>
+    <p:spTree>
+      <p:nvGrpSpPr>
+        <p:cNvPr id="1" name=""/>
+        <p:cNvGrpSpPr/>
+        <p:nvPr/>
+      </p:nvGrpSpPr>
+      <p:grpSpPr>
+        <a:xfrm>
+          <a:off x="0" y="0"/>
+          <a:ext cx="0" cy="0"/>
+          <a:chOff x="0" y="0"/>
+          <a:chExt cx="0" cy="0"/>
+        </a:xfrm>
+      </p:grpSpPr>
+      <p:sp>
+        <p:nvSpPr>
+          <p:cNvPr id="2" name="Title 1">
+            <a:extLst>
+              <a:ext uri="{FF2B5EF4-FFF2-40B4-BE49-F238E27FC236}">
                 <a16:creationId xmlns:a16="http://schemas.microsoft.com/office/drawing/2014/main" id="{8CDB229C-A1A7-48CD-9100-9B8D3B06426B}"/>
               </a:ext>
             </a:extLst>
@@ -6787,7 +6913,7 @@
 </p:sld>
 </file>
 
-<file path=ppt/slides/slide6.xml><?xml version="1.0" encoding="utf-8"?>
+<file path=ppt/slides/slide7.xml><?xml version="1.0" encoding="utf-8"?>
 <p:sld xmlns:a="http://schemas.openxmlformats.org/drawingml/2006/main" xmlns:r="http://schemas.openxmlformats.org/officeDocument/2006/relationships" xmlns:p="http://schemas.openxmlformats.org/presentationml/2006/main">
   <p:cSld>
     <p:spTree>

</xml_diff>